<commit_message>
3 files, clone one slide -> new files
</commit_message>
<xml_diff>
--- a/Examples/Data/Slides/CRUD/CloneOneSlidePerFilesToOneFile_out.pptx
+++ b/Examples/Data/Slides/CRUD/CloneOneSlidePerFilesToOneFile_out.pptx
@@ -798,7 +798,7 @@
           <a:bodyPr/>
           <a:lstStyle/>
           <a:p>
-            <a:fld id="{0191CAAD-A8CB-4095-B3C5-0A86CBDEFDC0}" type="datetimeFigureOut">
+            <a:fld id="{90724236-CA8E-4645-8946-BABE5D24A145}" type="datetimeFigureOut">
               <a:rPr lang="en-US" smtClean="0"/>
               <a:t>11/7/2009</a:t>
             </a:fld>
@@ -962,7 +962,7 @@
           <a:bodyPr/>
           <a:lstStyle/>
           <a:p>
-            <a:fld id="{0D65E9CC-F83F-4F41-A33F-AD4F8C49708E}" type="datetimeFigureOut">
+            <a:fld id="{80AAC6D9-75ED-4C7D-A45B-6C8E3EF2E2B0}" type="datetimeFigureOut">
               <a:rPr lang="en-US" smtClean="0"/>
               <a:t>11/7/2009</a:t>
             </a:fld>
@@ -1126,7 +1126,7 @@
           <a:bodyPr/>
           <a:lstStyle/>
           <a:p>
-            <a:fld id="{C50366DE-2BAA-4D25-8862-E25B0E4B96A9}" type="datetimeFigureOut">
+            <a:fld id="{E5AC7D11-34BC-4732-BE65-4935A4BFB10E}" type="datetimeFigureOut">
               <a:rPr lang="en-US" smtClean="0"/>
               <a:t>11/7/2009</a:t>
             </a:fld>
@@ -1470,7 +1470,7 @@
           <a:bodyPr/>
           <a:lstStyle/>
           <a:p>
-            <a:fld id="{76AFB5CE-F7AD-4FA2-B4AD-3BAD594970D1}" type="datetimeFigureOut">
+            <a:fld id="{B7B11153-2BA5-4CEC-927D-08F5950036F3}" type="datetimeFigureOut">
               <a:rPr lang="en-US" smtClean="0"/>
               <a:t>11/7/2009</a:t>
             </a:fld>
@@ -1700,7 +1700,7 @@
           <a:bodyPr/>
           <a:lstStyle/>
           <a:p>
-            <a:fld id="{D40B4383-3F3C-4758-8F52-B37B2130E860}" type="datetimeFigureOut">
+            <a:fld id="{0C6945B4-9E55-4F82-AF15-C59B7A6BBA3E}" type="datetimeFigureOut">
               <a:rPr lang="en-US" smtClean="0"/>
               <a:t>11/7/2009</a:t>
             </a:fld>
@@ -1971,7 +1971,7 @@
           <a:bodyPr/>
           <a:lstStyle/>
           <a:p>
-            <a:fld id="{4EF3504E-72D1-4160-BE03-81CD78FAB8A1}" type="datetimeFigureOut">
+            <a:fld id="{082473F8-2882-4599-8FD4-C51E5620DF44}" type="datetimeFigureOut">
               <a:rPr lang="en-US" smtClean="0"/>
               <a:t>11/7/2009</a:t>
             </a:fld>
@@ -2360,7 +2360,7 @@
           <a:bodyPr/>
           <a:lstStyle/>
           <a:p>
-            <a:fld id="{1C3F66B2-40DB-40C0-BE05-B8F9D898EFD6}" type="datetimeFigureOut">
+            <a:fld id="{0CB4C4A8-12B3-4565-8155-ABC82021B34E}" type="datetimeFigureOut">
               <a:rPr lang="en-US" smtClean="0"/>
               <a:t>11/7/2009</a:t>
             </a:fld>
@@ -2473,7 +2473,7 @@
           <a:bodyPr/>
           <a:lstStyle/>
           <a:p>
-            <a:fld id="{3841D3A2-FE4F-42F8-9751-664FF1A670D3}" type="datetimeFigureOut">
+            <a:fld id="{5189C3CA-AB5C-46B7-AEE6-578FDF676B43}" type="datetimeFigureOut">
               <a:rPr lang="en-US" smtClean="0"/>
               <a:t>11/7/2009</a:t>
             </a:fld>
@@ -2563,7 +2563,7 @@
           <a:bodyPr/>
           <a:lstStyle/>
           <a:p>
-            <a:fld id="{69D45898-1D59-41FC-B762-9E76FE62ABF3}" type="datetimeFigureOut">
+            <a:fld id="{404D76DC-676F-4AB4-ABE2-6FB323069885}" type="datetimeFigureOut">
               <a:rPr lang="en-US" smtClean="0"/>
               <a:t>11/7/2009</a:t>
             </a:fld>
@@ -2818,7 +2818,7 @@
           <a:bodyPr/>
           <a:lstStyle/>
           <a:p>
-            <a:fld id="{8FC4F998-AF99-486F-9BCC-CC8189D3BAAB}" type="datetimeFigureOut">
+            <a:fld id="{022277B8-A4A5-4FA4-8157-144996A48AA8}" type="datetimeFigureOut">
               <a:rPr lang="en-US" smtClean="0"/>
               <a:t>11/7/2009</a:t>
             </a:fld>
@@ -3050,7 +3050,7 @@
           <a:bodyPr/>
           <a:lstStyle/>
           <a:p>
-            <a:fld id="{B86986E7-C400-4796-8FE6-429DAE9153BA}" type="datetimeFigureOut">
+            <a:fld id="{C39BFF3A-0AD2-4D2B-99F0-369F04B89EBA}" type="datetimeFigureOut">
               <a:rPr lang="en-US" smtClean="0"/>
               <a:t>11/7/2009</a:t>
             </a:fld>

</xml_diff>